<commit_message>
fix:  ppt 2 add: 回放
</commit_message>
<xml_diff>
--- a/Algorithm/_____保研岛____Python蓝桥杯/课件/Python 课时2.pptx
+++ b/Algorithm/_____保研岛____Python蓝桥杯/课件/Python 课时2.pptx
@@ -31,6 +31,7 @@
     <p:sldId id="275" r:id="rId47"/>
     <p:sldId id="276" r:id="rId49"/>
     <p:sldId id="277" r:id="rId51"/>
+    <p:sldId id="278" r:id="rId53"/>
   </p:sldIdLst>
   <p:sldSz cx="12192000" cy="6858000"/>
   <p:notesSz cx="6858000" cy="9144000"/>
@@ -3615,6 +3616,219 @@
 </file>
 
 <file path=ppt/notesSlides/notesSlide22.xml><?xml version="1.0" encoding="utf-8"?>
+<p:notes xmlns:p="http://schemas.openxmlformats.org/presentationml/2006/main">
+  <p:cSld>
+    <p:spTree xmlns:a="http://schemas.openxmlformats.org/drawingml/2006/main" xmlns:r="http://schemas.openxmlformats.org/officeDocument/2006/relationships">
+      <p:nvGrpSpPr>
+        <p:cNvPr id="1" name=""/>
+        <p:cNvGrpSpPr/>
+        <p:nvPr/>
+      </p:nvGrpSpPr>
+      <p:grpSpPr>
+        <a:xfrm>
+          <a:off x="0" y="0"/>
+          <a:ext cx="0" cy="0"/>
+          <a:chOff x="0" y="0"/>
+          <a:chExt cx="0" cy="0"/>
+        </a:xfrm>
+      </p:grpSpPr>
+      <p:sp>
+        <p:nvSpPr>
+          <p:cNvPr id="2" name="Header Placeholder 1"/>
+          <p:cNvSpPr>
+            <a:spLocks noGrp="1"/>
+          </p:cNvSpPr>
+          <p:nvPr>
+            <p:ph type="hdr" sz="quarter"/>
+          </p:nvPr>
+        </p:nvSpPr>
+        <p:spPr>
+          <a:xfrm>
+            <a:off x="0" y="0"/>
+            <a:ext cx="3962400" cy="342900"/>
+          </a:xfrm>
+          <a:prstGeom prst="rect">
+            <a:avLst/>
+          </a:prstGeom>
+        </p:spPr>
+        <p:txBody>
+          <a:bodyPr vert="horz" lIns="91440" tIns="45720" rIns="91440" bIns="45720" rtlCol="0"/>
+          <a:lstStyle>
+            <a:lvl1pPr algn="l">
+              <a:defRPr sz="1200"/>
+            </a:lvl1pPr>
+          </a:lstStyle>
+          <a:p/>
+        </p:txBody>
+      </p:sp>
+      <p:sp>
+        <p:nvSpPr>
+          <p:cNvPr id="3" name="Date Placeholder 2"/>
+          <p:cNvSpPr>
+            <a:spLocks noGrp="1"/>
+          </p:cNvSpPr>
+          <p:nvPr>
+            <p:ph type="dt" idx="1"/>
+          </p:nvPr>
+        </p:nvSpPr>
+        <p:spPr>
+          <a:xfrm>
+            <a:off x="5180013" y="0"/>
+            <a:ext cx="3962400" cy="342900"/>
+          </a:xfrm>
+          <a:prstGeom prst="rect">
+            <a:avLst/>
+          </a:prstGeom>
+        </p:spPr>
+        <p:txBody>
+          <a:bodyPr vert="horz" lIns="91440" tIns="45720" rIns="91440" bIns="45720" rtlCol="0"/>
+          <a:lstStyle>
+            <a:lvl1pPr algn="r">
+              <a:defRPr sz="1200"/>
+            </a:lvl1pPr>
+          </a:lstStyle>
+          <a:p>
+            <a:r id="{B7268E1E-0E44-426D-905E-8AD9B19D2182}" type="datetimeFigureOut">
+              <a:rPr lang="cs-CZ" smtClean="0"/>
+              <a:t>1.7.2013</a:t>
+            </a:r>
+          </a:p>
+        </p:txBody>
+      </p:sp>
+      <p:sp>
+        <p:nvSpPr>
+          <p:cNvPr id="4" name="Slide Image Placeholder 3"/>
+          <p:cNvSpPr>
+            <a:spLocks noGrp="1" noRot="1" noChangeAspect="1"/>
+          </p:cNvSpPr>
+          <p:nvPr>
+            <p:ph type="sldImg" idx="2"/>
+          </p:nvPr>
+        </p:nvSpPr>
+        <p:spPr>
+          <a:xfrm>
+            <a:off x="2857500" y="512763"/>
+            <a:ext cx="3429000" cy="2566987"/>
+          </a:xfrm>
+          <a:prstGeom prst="rect">
+            <a:avLst/>
+          </a:prstGeom>
+          <a:noFill/>
+          <a:ln w="12700">
+            <a:solidFill>
+              <a:prstClr val="black"/>
+            </a:solidFill>
+          </a:ln>
+        </p:spPr>
+        <p:txBody>
+          <a:bodyPr vert="horz" lIns="91440" tIns="45720" rIns="91440" bIns="45720" rtlCol="0" anchor="ctr"/>
+          <a:lstStyle/>
+          <a:p/>
+        </p:txBody>
+      </p:sp>
+      <p:sp>
+        <p:nvSpPr>
+          <p:cNvPr id="5" name="Notes Placeholder 4"/>
+          <p:cNvSpPr>
+            <a:spLocks noGrp="1"/>
+          </p:cNvSpPr>
+          <p:nvPr>
+            <p:ph type="body" sz="quarter" idx="3"/>
+          </p:nvPr>
+        </p:nvSpPr>
+        <p:spPr>
+          <a:xfrm>
+            <a:off x="914400" y="3251200"/>
+            <a:ext cx="7315200" cy="3081338"/>
+          </a:xfrm>
+          <a:prstGeom prst="rect">
+            <a:avLst/>
+          </a:prstGeom>
+        </p:spPr>
+        <p:txBody>
+          <a:bodyPr vert="horz" lIns="91440" tIns="45720" rIns="91440" bIns="45720" rtlCol="0" anchor="ctr">
+            <a:noAutofit/>
+          </a:bodyPr>
+          <a:lstStyle>
+            <a:lvl1pPr algn="l">
+              <a:defRPr sz="1400" b="false" i="false" u="none" strike="noStrike"/>
+            </a:lvl1pPr>
+          </a:lstStyle>
+          <a:p>
+            <a:pPr algn="l"/>
+            <a:endParaRPr/>
+          </a:p>
+        </p:txBody>
+      </p:sp>
+      <p:sp>
+        <p:nvSpPr>
+          <p:cNvPr id="6" name="Footer Placeholder 5"/>
+          <p:cNvSpPr>
+            <a:spLocks noGrp="1"/>
+          </p:cNvSpPr>
+          <p:nvPr>
+            <p:ph type="ftr" sz="quarter" idx="4"/>
+          </p:nvPr>
+        </p:nvSpPr>
+        <p:spPr>
+          <a:xfrm>
+            <a:off x="0" y="6502400"/>
+            <a:ext cx="3962400" cy="341313"/>
+          </a:xfrm>
+          <a:prstGeom prst="rect">
+            <a:avLst/>
+          </a:prstGeom>
+        </p:spPr>
+        <p:txBody>
+          <a:bodyPr vert="horz" lIns="91440" tIns="45720" rIns="91440" bIns="45720" rtlCol="0" anchor="b"/>
+          <a:lstStyle>
+            <a:lvl1pPr algn="l">
+              <a:defRPr sz="1200"/>
+            </a:lvl1pPr>
+          </a:lstStyle>
+          <a:p/>
+        </p:txBody>
+      </p:sp>
+      <p:sp>
+        <p:nvSpPr>
+          <p:cNvPr id="7" name="Slide Number Placeholder 6"/>
+          <p:cNvSpPr>
+            <a:spLocks noGrp="1"/>
+          </p:cNvSpPr>
+          <p:nvPr>
+            <p:ph type="sldNum" sz="quarter" idx="5"/>
+          </p:nvPr>
+        </p:nvSpPr>
+        <p:spPr>
+          <a:xfrm>
+            <a:off x="5180013" y="6502400"/>
+            <a:ext cx="3962400" cy="341313"/>
+          </a:xfrm>
+          <a:prstGeom prst="rect">
+            <a:avLst/>
+          </a:prstGeom>
+        </p:spPr>
+        <p:txBody>
+          <a:bodyPr vert="horz" lIns="91440" tIns="45720" rIns="91440" bIns="45720" rtlCol="0" anchor="b"/>
+          <a:lstStyle>
+            <a:lvl1pPr algn="r">
+              <a:defRPr sz="1200"/>
+            </a:lvl1pPr>
+          </a:lstStyle>
+          <a:p>
+            <a:r id="{871B2431-D351-4C6E-A3CF-9DFAC0E3E050}" type="slidenum">
+              <a:rPr lang="cs-CZ" smtClean="0"/>
+              <a:t>‹#›</a:t>
+            </a:r>
+          </a:p>
+        </p:txBody>
+      </p:sp>
+    </p:spTree>
+  </p:cSld>
+</p:notes>
+</file>
+
+<file path=ppt/notesSlides/notesSlide23.xml><?xml version="1.0" encoding="utf-8"?>
 <p:notes xmlns:p="http://schemas.openxmlformats.org/presentationml/2006/main">
   <p:cSld>
     <p:spTree xmlns:a="http://schemas.openxmlformats.org/drawingml/2006/main" xmlns:r="http://schemas.openxmlformats.org/officeDocument/2006/relationships">
@@ -22066,8 +22280,8 @@
         </p:blipFill>
         <p:spPr>
           <a:xfrm rot="0" flipH="false" flipV="false">
-            <a:off x="3351527" y="939736"/>
-            <a:ext cx="7273990" cy="4629884"/>
+            <a:off x="1546376" y="2231237"/>
+            <a:ext cx="8737600" cy="4279900"/>
           </a:xfrm>
           <a:prstGeom prst="rect">
             <a:avLst/>
@@ -22078,24 +22292,203 @@
           </a:ln>
         </p:spPr>
       </p:pic>
+      <p:sp>
+        <p:nvSpPr>
+          <p:cNvPr name="AutoShape 5" id="5"/>
+          <p:cNvSpPr/>
+          <p:nvPr/>
+        </p:nvSpPr>
+        <p:spPr>
+          <a:xfrm rot="0" flipH="false" flipV="false">
+            <a:off x="1581150" y="1774037"/>
+            <a:ext cx="9029700" cy="914400"/>
+          </a:xfrm>
+          <a:prstGeom prst="rect">
+            <a:avLst/>
+          </a:prstGeom>
+          <a:noFill/>
+          <a:ln w="12700">
+            <a:noFill/>
+            <a:prstDash val="solid"/>
+          </a:ln>
+        </p:spPr>
+        <p:txBody>
+          <a:bodyPr anchor="ctr" rtlCol="false" lIns="0" rIns="0" tIns="0" bIns="0">
+            <a:noAutofit/>
+          </a:bodyPr>
+          <a:lstStyle/>
+          <a:p>
+            <a:pPr algn="l" indent="0">
+              <a:lnSpc>
+                <a:spcPct val="125000"/>
+              </a:lnSpc>
+              <a:defRPr/>
+            </a:pPr>
+            <a:r>
+              <a:rPr lang="en-US" b="false" i="false" strike="noStrike" u="none" sz="1600">
+                <a:solidFill>
+                  <a:srgbClr val="1F2329"/>
+                </a:solidFill>
+                <a:latin typeface="Noto Sans SC"/>
+                <a:ea typeface="Noto Sans SC"/>
+                <a:cs typeface="Noto Sans SC"/>
+                <a:sym typeface="Noto Sans SC"/>
+              </a:rPr>
+              <a:t>逆波兰表示法（Reverse Polish notation，RPN，或逆波兰记法），是一种是由波兰数学家扬·武卡谢维奇1920年引入的数学表达式形式，在逆波兰记法中，所有操作符置于操作数的后面，因此也被称为后缀表示法。逆波兰记法不需要括号来标识操作符的优先级。</a:t>
+            </a:r>
+            <a:endParaRPr lang="en-US" sz="1100"/>
+          </a:p>
+        </p:txBody>
+      </p:sp>
+    </p:spTree>
+  </p:cSld>
+  <p:clrMapOvr>
+    <a:masterClrMapping/>
+  </p:clrMapOvr>
+</p:sld>
+</file>
+
+<file path=ppt/slides/slide22.xml><?xml version="1.0" encoding="utf-8"?>
+<p:sld xmlns:p="http://schemas.openxmlformats.org/presentationml/2006/main" xmlns:a="http://schemas.openxmlformats.org/drawingml/2006/main" xmlns:r="http://schemas.openxmlformats.org/officeDocument/2006/relationships" show="true">
+  <p:cSld>
+    <p:spTree>
+      <p:nvGrpSpPr>
+        <p:cNvPr id="1" name=""/>
+        <p:cNvGrpSpPr/>
+        <p:nvPr/>
+      </p:nvGrpSpPr>
+      <p:grpSpPr>
+        <a:xfrm>
+          <a:off x="0" y="0"/>
+          <a:ext cx="0" cy="0"/>
+          <a:chOff x="0" y="0"/>
+          <a:chExt cx="0" cy="0"/>
+        </a:xfrm>
+      </p:grpSpPr>
+      <p:sp>
+        <p:nvSpPr>
+          <p:cNvPr name="AutoShape 2" id="2"/>
+          <p:cNvSpPr/>
+          <p:nvPr>
+            <p:ph idx="3" type="body" sz="quarter" hasCustomPrompt="true"/>
+          </p:nvPr>
+        </p:nvSpPr>
+        <p:spPr>
+          <a:xfrm rot="0" flipH="false" flipV="false">
+            <a:off x="171307" y="76136"/>
+            <a:ext cx="7810500" cy="863600"/>
+          </a:xfrm>
+          <a:prstGeom prst="rect">
+            <a:avLst/>
+          </a:prstGeom>
+        </p:spPr>
+        <p:txBody>
+          <a:bodyPr lIns="0" rIns="0" tIns="0" bIns="0">
+            <a:noAutofit/>
+          </a:bodyPr>
+          <a:lstStyle>
+            <a:lvl1pPr algn="l">
+              <a:lnSpc>
+                <a:spcPct val="125000"/>
+              </a:lnSpc>
+              <a:defRPr sz="4500" b="true" i="false" u="none" strike="noStrike" spc="0">
+                <a:solidFill>
+                  <a:srgbClr val="1F2329">
+                    <a:alpha val="100000"/>
+                  </a:srgbClr>
+                </a:solidFill>
+                <a:latin typeface="Noto Sans SC"/>
+              </a:defRPr>
+            </a:lvl1pPr>
+          </a:lstStyle>
+          <a:p>
+            <a:pPr algn="l" indent="0">
+              <a:lnSpc>
+                <a:spcPct val="125000"/>
+              </a:lnSpc>
+            </a:pPr>
+            <a:r>
+              <a:rPr lang="en-US" b="true" i="false" strike="noStrike" u="none" sz="4500">
+                <a:solidFill>
+                  <a:srgbClr val="1F2329"/>
+                </a:solidFill>
+                <a:latin typeface="Noto Sans SC"/>
+                <a:ea typeface="Noto Sans SC"/>
+                <a:cs typeface="Noto Sans SC"/>
+                <a:sym typeface="Noto Sans SC"/>
+              </a:rPr>
+              <a:t>2.2 算法入门2</a:t>
+            </a:r>
+          </a:p>
+        </p:txBody>
+      </p:sp>
+      <p:sp>
+        <p:nvSpPr>
+          <p:cNvPr name="AutoShape 3" id="3"/>
+          <p:cNvSpPr/>
+          <p:nvPr/>
+        </p:nvSpPr>
+        <p:spPr>
+          <a:xfrm rot="0" flipH="false" flipV="false">
+            <a:off x="105743" y="939736"/>
+            <a:ext cx="3876564" cy="647700"/>
+          </a:xfrm>
+          <a:prstGeom prst="rect">
+            <a:avLst/>
+          </a:prstGeom>
+          <a:noFill/>
+          <a:ln w="25400">
+            <a:noFill/>
+            <a:prstDash val="solid"/>
+          </a:ln>
+          <a:effectLst/>
+        </p:spPr>
+        <p:txBody>
+          <a:bodyPr anchor="ctr" rtlCol="false" lIns="0" rIns="0" tIns="0" bIns="0">
+            <a:noAutofit/>
+          </a:bodyPr>
+          <a:lstStyle/>
+          <a:p>
+            <a:pPr algn="l" indent="0">
+              <a:lnSpc>
+                <a:spcPct val="125000"/>
+              </a:lnSpc>
+              <a:defRPr/>
+            </a:pPr>
+            <a:r>
+              <a:rPr lang="en-US" b="true" i="false" strike="noStrike" u="none" sz="3400">
+                <a:solidFill>
+                  <a:srgbClr val="1F2329"/>
+                </a:solidFill>
+                <a:latin typeface="Noto Sans SC"/>
+                <a:ea typeface="Noto Sans SC"/>
+                <a:cs typeface="Noto Sans SC"/>
+                <a:sym typeface="Noto Sans SC"/>
+              </a:rPr>
+              <a:t>逆波兰表达式</a:t>
+            </a:r>
+            <a:endParaRPr lang="en-US" sz="1100"/>
+          </a:p>
+        </p:txBody>
+      </p:sp>
       <p:pic>
         <p:nvPicPr>
-          <p:cNvPr name="Picture 5" id="5"/>
+          <p:cNvPr name="Picture 4" id="4"/>
           <p:cNvPicPr>
             <a:picLocks noChangeAspect="true"/>
           </p:cNvPicPr>
           <p:nvPr/>
         </p:nvPicPr>
         <p:blipFill>
-          <a:blip r:embed="rId3"/>
+          <a:blip r:embed="rId2"/>
           <a:stretch>
             <a:fillRect/>
           </a:stretch>
         </p:blipFill>
         <p:spPr>
           <a:xfrm rot="0" flipH="false" flipV="false">
-            <a:off x="614936" y="5569620"/>
-            <a:ext cx="9532298" cy="1480688"/>
+            <a:off x="1721318" y="1770233"/>
+            <a:ext cx="7810500" cy="4707355"/>
           </a:xfrm>
           <a:prstGeom prst="rect">
             <a:avLst/>
@@ -22114,7 +22507,7 @@
 </p:sld>
 </file>
 
-<file path=ppt/slides/slide22.xml><?xml version="1.0" encoding="utf-8"?>
+<file path=ppt/slides/slide23.xml><?xml version="1.0" encoding="utf-8"?>
 <p:sld xmlns:p="http://schemas.openxmlformats.org/presentationml/2006/main" xmlns:a="http://schemas.openxmlformats.org/drawingml/2006/main" xmlns:r="http://schemas.openxmlformats.org/officeDocument/2006/relationships" show="true">
   <p:cSld>
     <p:spTree>

</xml_diff>